<commit_message>
presentation updates and old tests
</commit_message>
<xml_diff>
--- a/YusufEmreBayrakcıStajSunum.pptx
+++ b/YusufEmreBayrakcıStajSunum.pptx
@@ -927,7 +927,7 @@
           <a:bodyPr/>
           <a:lstStyle/>
           <a:p>
-            <a:endParaRPr lang="en-US" altLang="tr-TR">
+            <a:endParaRPr lang="en-US" altLang="tr-TR" dirty="0">
               <a:latin typeface="Arial" panose="020B0604020202020204" pitchFamily="34" charset="0"/>
             </a:endParaRPr>
           </a:p>
@@ -1652,7 +1652,7 @@
             </a:r>
             <a:r>
               <a:rPr lang="tr-TR" dirty="0"/>
-              <a:t> </a:t>
+              <a:t> ,</a:t>
             </a:r>
             <a:r>
               <a:rPr lang="tr-TR" dirty="0" err="1"/>
@@ -1669,19 +1669,6 @@
             <a:r>
               <a:rPr lang="tr-TR" dirty="0"/>
               <a:t> gibi servisleri kullanmayı öğrendim.</a:t>
-            </a:r>
-          </a:p>
-          <a:p>
-            <a:r>
-              <a:rPr lang="tr-TR" b="1" dirty="0"/>
-              <a:t>Veriye Dayalı Karar</a:t>
-            </a:r>
-            <a:br>
-              <a:rPr lang="tr-TR" dirty="0"/>
-            </a:br>
-            <a:r>
-              <a:rPr lang="tr-TR" dirty="0"/>
-              <a:t>Test sonuçlarına dayanarak en uygun teknolojiyi belirledim.</a:t>
             </a:r>
           </a:p>
           <a:p>
@@ -11973,20 +11960,20 @@
 </file>
 
 <file path=customXml/item1.xml><?xml version="1.0" encoding="utf-8"?>
+<p:properties xmlns:p="http://schemas.microsoft.com/office/2006/metadata/properties" xmlns:xsi="http://www.w3.org/2001/XMLSchema-instance" xmlns:pc="http://schemas.microsoft.com/office/infopath/2007/PartnerControls">
+  <documentManagement>
+    <_activity xmlns="f048bf54-aa83-4439-b641-98df509ced0a" xsi:nil="true"/>
+  </documentManagement>
+</p:properties>
+</file>
+
+<file path=customXml/item2.xml><?xml version="1.0" encoding="utf-8"?>
 <?mso-contentType ?>
 <FormTemplates xmlns="http://schemas.microsoft.com/sharepoint/v3/contenttype/forms">
   <Display>DocumentLibraryForm</Display>
   <Edit>DocumentLibraryForm</Edit>
   <New>DocumentLibraryForm</New>
 </FormTemplates>
-</file>
-
-<file path=customXml/item2.xml><?xml version="1.0" encoding="utf-8"?>
-<p:properties xmlns:p="http://schemas.microsoft.com/office/2006/metadata/properties" xmlns:xsi="http://www.w3.org/2001/XMLSchema-instance" xmlns:pc="http://schemas.microsoft.com/office/infopath/2007/PartnerControls">
-  <documentManagement>
-    <_activity xmlns="f048bf54-aa83-4439-b641-98df509ced0a" xsi:nil="true"/>
-  </documentManagement>
-</p:properties>
 </file>
 
 <file path=customXml/item3.xml><?xml version="1.0" encoding="utf-8"?>
@@ -12146,14 +12133,6 @@
 </file>
 
 <file path=customXml/itemProps1.xml><?xml version="1.0" encoding="utf-8"?>
-<ds:datastoreItem xmlns:ds="http://schemas.openxmlformats.org/officeDocument/2006/customXml" ds:itemID="{3A3AC79A-8B1C-4BE4-9709-1C5B10B3B3C0}">
-  <ds:schemaRefs>
-    <ds:schemaRef ds:uri="http://schemas.microsoft.com/sharepoint/v3/contenttype/forms"/>
-  </ds:schemaRefs>
-</ds:datastoreItem>
-</file>
-
-<file path=customXml/itemProps2.xml><?xml version="1.0" encoding="utf-8"?>
 <ds:datastoreItem xmlns:ds="http://schemas.openxmlformats.org/officeDocument/2006/customXml" ds:itemID="{0C9E674A-4883-4338-9B0C-081EEE383D92}">
   <ds:schemaRefs>
     <ds:schemaRef ds:uri="http://schemas.microsoft.com/office/infopath/2007/PartnerControls"/>
@@ -12165,6 +12144,14 @@
     <ds:schemaRef ds:uri="http://schemas.microsoft.com/office/2006/metadata/properties"/>
     <ds:schemaRef ds:uri="f048bf54-aa83-4439-b641-98df509ced0a"/>
     <ds:schemaRef ds:uri="http://www.w3.org/XML/1998/namespace"/>
+  </ds:schemaRefs>
+</ds:datastoreItem>
+</file>
+
+<file path=customXml/itemProps2.xml><?xml version="1.0" encoding="utf-8"?>
+<ds:datastoreItem xmlns:ds="http://schemas.openxmlformats.org/officeDocument/2006/customXml" ds:itemID="{3A3AC79A-8B1C-4BE4-9709-1C5B10B3B3C0}">
+  <ds:schemaRefs>
+    <ds:schemaRef ds:uri="http://schemas.microsoft.com/sharepoint/v3/contenttype/forms"/>
   </ds:schemaRefs>
 </ds:datastoreItem>
 </file>

</xml_diff>

<commit_message>
Added Intership report to repository
</commit_message>
<xml_diff>
--- a/YusufEmreBayrakcıStajSunum.pptx
+++ b/YusufEmreBayrakcıStajSunum.pptx
@@ -290,7 +290,7 @@
               <a:pPr>
                 <a:defRPr/>
               </a:pPr>
-              <a:t>10.07.2025</a:t>
+              <a:t>1.08.2025</a:t>
             </a:fld>
             <a:endParaRPr lang="tr-TR" altLang="tr-TR"/>
           </a:p>
@@ -12095,20 +12095,20 @@
 </file>
 
 <file path=customXml/item1.xml><?xml version="1.0" encoding="utf-8"?>
+<p:properties xmlns:p="http://schemas.microsoft.com/office/2006/metadata/properties" xmlns:xsi="http://www.w3.org/2001/XMLSchema-instance" xmlns:pc="http://schemas.microsoft.com/office/infopath/2007/PartnerControls">
+  <documentManagement>
+    <_activity xmlns="f048bf54-aa83-4439-b641-98df509ced0a" xsi:nil="true"/>
+  </documentManagement>
+</p:properties>
+</file>
+
+<file path=customXml/item2.xml><?xml version="1.0" encoding="utf-8"?>
 <?mso-contentType ?>
 <FormTemplates xmlns="http://schemas.microsoft.com/sharepoint/v3/contenttype/forms">
   <Display>DocumentLibraryForm</Display>
   <Edit>DocumentLibraryForm</Edit>
   <New>DocumentLibraryForm</New>
 </FormTemplates>
-</file>
-
-<file path=customXml/item2.xml><?xml version="1.0" encoding="utf-8"?>
-<p:properties xmlns:p="http://schemas.microsoft.com/office/2006/metadata/properties" xmlns:xsi="http://www.w3.org/2001/XMLSchema-instance" xmlns:pc="http://schemas.microsoft.com/office/infopath/2007/PartnerControls">
-  <documentManagement>
-    <_activity xmlns="f048bf54-aa83-4439-b641-98df509ced0a" xsi:nil="true"/>
-  </documentManagement>
-</p:properties>
 </file>
 
 <file path=customXml/item3.xml><?xml version="1.0" encoding="utf-8"?>
@@ -12268,14 +12268,6 @@
 </file>
 
 <file path=customXml/itemProps1.xml><?xml version="1.0" encoding="utf-8"?>
-<ds:datastoreItem xmlns:ds="http://schemas.openxmlformats.org/officeDocument/2006/customXml" ds:itemID="{3A3AC79A-8B1C-4BE4-9709-1C5B10B3B3C0}">
-  <ds:schemaRefs>
-    <ds:schemaRef ds:uri="http://schemas.microsoft.com/sharepoint/v3/contenttype/forms"/>
-  </ds:schemaRefs>
-</ds:datastoreItem>
-</file>
-
-<file path=customXml/itemProps2.xml><?xml version="1.0" encoding="utf-8"?>
 <ds:datastoreItem xmlns:ds="http://schemas.openxmlformats.org/officeDocument/2006/customXml" ds:itemID="{0C9E674A-4883-4338-9B0C-081EEE383D92}">
   <ds:schemaRefs>
     <ds:schemaRef ds:uri="http://purl.org/dc/terms/"/>
@@ -12287,6 +12279,14 @@
     <ds:schemaRef ds:uri="http://purl.org/dc/dcmitype/"/>
     <ds:schemaRef ds:uri="f048bf54-aa83-4439-b641-98df509ced0a"/>
     <ds:schemaRef ds:uri="http://schemas.microsoft.com/office/2006/metadata/properties"/>
+  </ds:schemaRefs>
+</ds:datastoreItem>
+</file>
+
+<file path=customXml/itemProps2.xml><?xml version="1.0" encoding="utf-8"?>
+<ds:datastoreItem xmlns:ds="http://schemas.openxmlformats.org/officeDocument/2006/customXml" ds:itemID="{3A3AC79A-8B1C-4BE4-9709-1C5B10B3B3C0}">
+  <ds:schemaRefs>
+    <ds:schemaRef ds:uri="http://schemas.microsoft.com/sharepoint/v3/contenttype/forms"/>
   </ds:schemaRefs>
 </ds:datastoreItem>
 </file>

</xml_diff>